<commit_message>
completed presentation for district meeting
</commit_message>
<xml_diff>
--- a/Docs/District/Communications/Communications Survey Presentation.pptx
+++ b/Docs/District/Communications/Communications Survey Presentation.pptx
@@ -5,10 +5,10 @@
     <p:sldMasterId id="2147483648" r:id="rId1"/>
   </p:sldMasterIdLst>
   <p:notesMasterIdLst>
-    <p:notesMasterId r:id="rId16"/>
+    <p:notesMasterId r:id="rId17"/>
   </p:notesMasterIdLst>
   <p:handoutMasterIdLst>
-    <p:handoutMasterId r:id="rId17"/>
+    <p:handoutMasterId r:id="rId18"/>
   </p:handoutMasterIdLst>
   <p:sldIdLst>
     <p:sldId id="256" r:id="rId2"/>
@@ -25,6 +25,7 @@
     <p:sldId id="268" r:id="rId13"/>
     <p:sldId id="269" r:id="rId14"/>
     <p:sldId id="258" r:id="rId15"/>
+    <p:sldId id="270" r:id="rId16"/>
   </p:sldIdLst>
   <p:sldSz cx="9144000" cy="6858000" type="screen4x3"/>
   <p:notesSz cx="6858000" cy="9144000"/>
@@ -291,7 +292,7 @@
             <a:fld id="{DF098604-4709-465C-84F5-A41B31EA864E}" type="datetime1">
               <a:rPr lang="en-US" altLang="en-US"/>
               <a:pPr/>
-              <a:t>3/21/2018</a:t>
+              <a:t>4/5/2018</a:t>
             </a:fld>
             <a:endParaRPr lang="en-US" altLang="en-US"/>
           </a:p>
@@ -515,7 +516,7 @@
             <a:fld id="{16C10447-0BB8-4D51-9A18-328312B9FCBA}" type="datetime1">
               <a:rPr lang="en-US" altLang="en-US"/>
               <a:pPr/>
-              <a:t>3/21/2018</a:t>
+              <a:t>4/5/2018</a:t>
             </a:fld>
             <a:endParaRPr lang="en-US" altLang="en-US"/>
           </a:p>
@@ -1043,7 +1044,7 @@
             <a:fld id="{AA5541D0-0322-4335-BF05-882B833B0A6F}" type="datetime1">
               <a:rPr lang="en-US" altLang="en-US"/>
               <a:pPr/>
-              <a:t>3/21/2018</a:t>
+              <a:t>4/5/2018</a:t>
             </a:fld>
             <a:endParaRPr lang="en-US" altLang="en-US"/>
           </a:p>
@@ -1287,7 +1288,7 @@
             <a:fld id="{5C5F7C8C-89A0-4E52-B168-8FCAABE8067D}" type="datetime1">
               <a:rPr lang="en-US" altLang="en-US"/>
               <a:pPr/>
-              <a:t>3/21/2018</a:t>
+              <a:t>4/5/2018</a:t>
             </a:fld>
             <a:endParaRPr lang="en-US" altLang="en-US"/>
           </a:p>
@@ -1609,7 +1610,7 @@
             <a:fld id="{21CBAB25-3909-4270-BE79-9186CF4C14FF}" type="datetime1">
               <a:rPr lang="en-US" altLang="en-US"/>
               <a:pPr/>
-              <a:t>3/21/2018</a:t>
+              <a:t>4/5/2018</a:t>
             </a:fld>
             <a:endParaRPr lang="en-US" altLang="en-US"/>
           </a:p>
@@ -2099,7 +2100,7 @@
             <a:fld id="{37D2D022-AA4D-4168-AAEE-B858F143A0D1}" type="datetime1">
               <a:rPr lang="en-US" altLang="en-US"/>
               <a:pPr/>
-              <a:t>3/21/2018</a:t>
+              <a:t>4/5/2018</a:t>
             </a:fld>
             <a:endParaRPr lang="en-US" altLang="en-US"/>
           </a:p>
@@ -2287,7 +2288,7 @@
             <a:fld id="{EB09FDB2-6419-4C57-8328-FB0555339896}" type="datetime1">
               <a:rPr lang="en-US" altLang="en-US"/>
               <a:pPr/>
-              <a:t>3/21/2018</a:t>
+              <a:t>4/5/2018</a:t>
             </a:fld>
             <a:endParaRPr lang="en-US" altLang="en-US"/>
           </a:p>
@@ -2393,7 +2394,7 @@
             <a:fld id="{8F4529BF-9C91-4C25-BBDC-A4F80A428864}" type="datetime1">
               <a:rPr lang="en-US" altLang="en-US"/>
               <a:pPr/>
-              <a:t>3/21/2018</a:t>
+              <a:t>4/5/2018</a:t>
             </a:fld>
             <a:endParaRPr lang="en-US" altLang="en-US"/>
           </a:p>
@@ -2659,7 +2660,7 @@
             <a:fld id="{0DBD2CC1-2CF6-4304-A445-923EB37D1633}" type="datetime1">
               <a:rPr lang="en-US" altLang="en-US"/>
               <a:pPr/>
-              <a:t>3/21/2018</a:t>
+              <a:t>4/5/2018</a:t>
             </a:fld>
             <a:endParaRPr lang="en-US" altLang="en-US"/>
           </a:p>
@@ -3160,7 +3161,7 @@
             <a:fld id="{77AA16BA-A721-4BC6-AA59-C930D5E642FD}" type="datetime1">
               <a:rPr lang="en-US" altLang="en-US"/>
               <a:pPr/>
-              <a:t>3/21/2018</a:t>
+              <a:t>4/5/2018</a:t>
             </a:fld>
             <a:endParaRPr lang="en-US" altLang="en-US"/>
           </a:p>
@@ -3951,7 +3952,7 @@
                 <a:latin typeface="Helvetica" panose="020B0604020202020204" pitchFamily="34" charset="0"/>
                 <a:ea typeface="ヒラギノ角ゴ Pro W3" charset="-128"/>
               </a:rPr>
-              <a:t>How important is…</a:t>
+              <a:t>How important are…</a:t>
             </a:r>
           </a:p>
           <a:p>
@@ -4136,10 +4137,10 @@
       </p:sp>
       <p:pic>
         <p:nvPicPr>
-          <p:cNvPr id="2" name="Picture 1">
+          <p:cNvPr id="3" name="Picture 2">
             <a:extLst>
               <a:ext uri="{FF2B5EF4-FFF2-40B4-BE49-F238E27FC236}">
-                <a16:creationId xmlns:a16="http://schemas.microsoft.com/office/drawing/2014/main" id="{D5C19BF2-8D20-4474-BCE0-F01ADB6E373B}"/>
+                <a16:creationId xmlns:a16="http://schemas.microsoft.com/office/drawing/2014/main" id="{0CDAC817-53E3-448A-A35A-685A3AF5C5E4}"/>
               </a:ext>
             </a:extLst>
           </p:cNvPr>
@@ -4156,8 +4157,8 @@
         </p:blipFill>
         <p:spPr>
           <a:xfrm>
-            <a:off x="1138237" y="2140743"/>
-            <a:ext cx="6867525" cy="3152775"/>
+            <a:off x="1138235" y="2085023"/>
+            <a:ext cx="7446442" cy="3749040"/>
           </a:xfrm>
           <a:prstGeom prst="rect">
             <a:avLst/>
@@ -4446,10 +4447,10 @@
       </p:sp>
       <p:pic>
         <p:nvPicPr>
-          <p:cNvPr id="2" name="Picture 1">
+          <p:cNvPr id="3" name="Picture 2">
             <a:extLst>
               <a:ext uri="{FF2B5EF4-FFF2-40B4-BE49-F238E27FC236}">
-                <a16:creationId xmlns:a16="http://schemas.microsoft.com/office/drawing/2014/main" id="{EBD0CB16-2A99-46AD-A2EE-D102F486631A}"/>
+                <a16:creationId xmlns:a16="http://schemas.microsoft.com/office/drawing/2014/main" id="{6B4BC121-333C-4CA5-B104-9FAEB0D6114E}"/>
               </a:ext>
             </a:extLst>
           </p:cNvPr>
@@ -4466,8 +4467,8 @@
         </p:blipFill>
         <p:spPr>
           <a:xfrm>
-            <a:off x="1128712" y="2188368"/>
-            <a:ext cx="6886575" cy="3057525"/>
+            <a:off x="491066" y="2176463"/>
+            <a:ext cx="8161867" cy="3657600"/>
           </a:xfrm>
           <a:prstGeom prst="rect">
             <a:avLst/>
@@ -4756,10 +4757,10 @@
       </p:sp>
       <p:pic>
         <p:nvPicPr>
-          <p:cNvPr id="2" name="Picture 1">
+          <p:cNvPr id="3" name="Picture 2">
             <a:extLst>
               <a:ext uri="{FF2B5EF4-FFF2-40B4-BE49-F238E27FC236}">
-                <a16:creationId xmlns:a16="http://schemas.microsoft.com/office/drawing/2014/main" id="{85CB9925-1AE6-4E69-940B-731BB63B1CA7}"/>
+                <a16:creationId xmlns:a16="http://schemas.microsoft.com/office/drawing/2014/main" id="{8C3E16AE-B841-46BF-A521-A92C8C7EDC1E}"/>
               </a:ext>
             </a:extLst>
           </p:cNvPr>
@@ -4776,8 +4777,8 @@
         </p:blipFill>
         <p:spPr>
           <a:xfrm>
-            <a:off x="1152525" y="2264568"/>
-            <a:ext cx="6838950" cy="2905125"/>
+            <a:off x="825062" y="2176463"/>
+            <a:ext cx="7493876" cy="3657600"/>
           </a:xfrm>
           <a:prstGeom prst="rect">
             <a:avLst/>
@@ -5066,10 +5067,10 @@
       </p:sp>
       <p:pic>
         <p:nvPicPr>
-          <p:cNvPr id="2" name="Picture 1">
+          <p:cNvPr id="3" name="Picture 2">
             <a:extLst>
               <a:ext uri="{FF2B5EF4-FFF2-40B4-BE49-F238E27FC236}">
-                <a16:creationId xmlns:a16="http://schemas.microsoft.com/office/drawing/2014/main" id="{3AB80C2C-F4E1-49B0-859A-A705BB32C3C5}"/>
+                <a16:creationId xmlns:a16="http://schemas.microsoft.com/office/drawing/2014/main" id="{C551DF24-510C-407C-91CB-9C093FD2DA15}"/>
               </a:ext>
             </a:extLst>
           </p:cNvPr>
@@ -5086,8 +5087,8 @@
         </p:blipFill>
         <p:spPr>
           <a:xfrm>
-            <a:off x="1376362" y="2074068"/>
-            <a:ext cx="6391275" cy="3286125"/>
+            <a:off x="966801" y="2176463"/>
+            <a:ext cx="7210398" cy="3657600"/>
           </a:xfrm>
           <a:prstGeom prst="rect">
             <a:avLst/>
@@ -5440,6 +5441,754 @@
   <p:clrMapOvr>
     <a:masterClrMapping/>
   </p:clrMapOvr>
+  <p:timing>
+    <p:tnLst>
+      <p:par>
+        <p:cTn id="1" dur="indefinite" restart="never" nodeType="tmRoot">
+          <p:childTnLst>
+            <p:seq concurrent="1" nextAc="seek">
+              <p:cTn id="2" dur="indefinite" nodeType="mainSeq">
+                <p:childTnLst>
+                  <p:par>
+                    <p:cTn id="3" fill="hold">
+                      <p:stCondLst>
+                        <p:cond delay="indefinite"/>
+                      </p:stCondLst>
+                      <p:childTnLst>
+                        <p:par>
+                          <p:cTn id="4" fill="hold">
+                            <p:stCondLst>
+                              <p:cond delay="0"/>
+                            </p:stCondLst>
+                            <p:childTnLst>
+                              <p:par>
+                                <p:cTn id="5" presetID="1" presetClass="entr" presetSubtype="0" fill="hold" grpId="0" nodeType="clickEffect">
+                                  <p:stCondLst>
+                                    <p:cond delay="0"/>
+                                  </p:stCondLst>
+                                  <p:childTnLst>
+                                    <p:set>
+                                      <p:cBhvr>
+                                        <p:cTn id="6" dur="1" fill="hold">
+                                          <p:stCondLst>
+                                            <p:cond delay="0"/>
+                                          </p:stCondLst>
+                                        </p:cTn>
+                                        <p:tgtEl>
+                                          <p:spTgt spid="3">
+                                            <p:txEl>
+                                              <p:pRg st="0" end="0"/>
+                                            </p:txEl>
+                                          </p:spTgt>
+                                        </p:tgtEl>
+                                        <p:attrNameLst>
+                                          <p:attrName>style.visibility</p:attrName>
+                                        </p:attrNameLst>
+                                      </p:cBhvr>
+                                      <p:to>
+                                        <p:strVal val="visible"/>
+                                      </p:to>
+                                    </p:set>
+                                  </p:childTnLst>
+                                </p:cTn>
+                              </p:par>
+                              <p:par>
+                                <p:cTn id="7" presetID="1" presetClass="entr" presetSubtype="0" fill="hold" grpId="0" nodeType="withEffect">
+                                  <p:stCondLst>
+                                    <p:cond delay="0"/>
+                                  </p:stCondLst>
+                                  <p:childTnLst>
+                                    <p:set>
+                                      <p:cBhvr>
+                                        <p:cTn id="8" dur="1" fill="hold">
+                                          <p:stCondLst>
+                                            <p:cond delay="0"/>
+                                          </p:stCondLst>
+                                        </p:cTn>
+                                        <p:tgtEl>
+                                          <p:spTgt spid="3">
+                                            <p:txEl>
+                                              <p:pRg st="1" end="1"/>
+                                            </p:txEl>
+                                          </p:spTgt>
+                                        </p:tgtEl>
+                                        <p:attrNameLst>
+                                          <p:attrName>style.visibility</p:attrName>
+                                        </p:attrNameLst>
+                                      </p:cBhvr>
+                                      <p:to>
+                                        <p:strVal val="visible"/>
+                                      </p:to>
+                                    </p:set>
+                                  </p:childTnLst>
+                                </p:cTn>
+                              </p:par>
+                              <p:par>
+                                <p:cTn id="9" presetID="1" presetClass="entr" presetSubtype="0" fill="hold" grpId="0" nodeType="withEffect">
+                                  <p:stCondLst>
+                                    <p:cond delay="0"/>
+                                  </p:stCondLst>
+                                  <p:childTnLst>
+                                    <p:set>
+                                      <p:cBhvr>
+                                        <p:cTn id="10" dur="1" fill="hold">
+                                          <p:stCondLst>
+                                            <p:cond delay="0"/>
+                                          </p:stCondLst>
+                                        </p:cTn>
+                                        <p:tgtEl>
+                                          <p:spTgt spid="3">
+                                            <p:txEl>
+                                              <p:pRg st="2" end="2"/>
+                                            </p:txEl>
+                                          </p:spTgt>
+                                        </p:tgtEl>
+                                        <p:attrNameLst>
+                                          <p:attrName>style.visibility</p:attrName>
+                                        </p:attrNameLst>
+                                      </p:cBhvr>
+                                      <p:to>
+                                        <p:strVal val="visible"/>
+                                      </p:to>
+                                    </p:set>
+                                  </p:childTnLst>
+                                </p:cTn>
+                              </p:par>
+                              <p:par>
+                                <p:cTn id="11" presetID="1" presetClass="entr" presetSubtype="0" fill="hold" grpId="0" nodeType="withEffect">
+                                  <p:stCondLst>
+                                    <p:cond delay="0"/>
+                                  </p:stCondLst>
+                                  <p:childTnLst>
+                                    <p:set>
+                                      <p:cBhvr>
+                                        <p:cTn id="12" dur="1" fill="hold">
+                                          <p:stCondLst>
+                                            <p:cond delay="0"/>
+                                          </p:stCondLst>
+                                        </p:cTn>
+                                        <p:tgtEl>
+                                          <p:spTgt spid="3">
+                                            <p:txEl>
+                                              <p:pRg st="3" end="3"/>
+                                            </p:txEl>
+                                          </p:spTgt>
+                                        </p:tgtEl>
+                                        <p:attrNameLst>
+                                          <p:attrName>style.visibility</p:attrName>
+                                        </p:attrNameLst>
+                                      </p:cBhvr>
+                                      <p:to>
+                                        <p:strVal val="visible"/>
+                                      </p:to>
+                                    </p:set>
+                                  </p:childTnLst>
+                                </p:cTn>
+                              </p:par>
+                              <p:par>
+                                <p:cTn id="13" presetID="1" presetClass="entr" presetSubtype="0" fill="hold" grpId="0" nodeType="withEffect">
+                                  <p:stCondLst>
+                                    <p:cond delay="0"/>
+                                  </p:stCondLst>
+                                  <p:childTnLst>
+                                    <p:set>
+                                      <p:cBhvr>
+                                        <p:cTn id="14" dur="1" fill="hold">
+                                          <p:stCondLst>
+                                            <p:cond delay="0"/>
+                                          </p:stCondLst>
+                                        </p:cTn>
+                                        <p:tgtEl>
+                                          <p:spTgt spid="3">
+                                            <p:txEl>
+                                              <p:pRg st="4" end="4"/>
+                                            </p:txEl>
+                                          </p:spTgt>
+                                        </p:tgtEl>
+                                        <p:attrNameLst>
+                                          <p:attrName>style.visibility</p:attrName>
+                                        </p:attrNameLst>
+                                      </p:cBhvr>
+                                      <p:to>
+                                        <p:strVal val="visible"/>
+                                      </p:to>
+                                    </p:set>
+                                  </p:childTnLst>
+                                </p:cTn>
+                              </p:par>
+                            </p:childTnLst>
+                          </p:cTn>
+                        </p:par>
+                      </p:childTnLst>
+                    </p:cTn>
+                  </p:par>
+                  <p:par>
+                    <p:cTn id="15" fill="hold">
+                      <p:stCondLst>
+                        <p:cond delay="indefinite"/>
+                      </p:stCondLst>
+                      <p:childTnLst>
+                        <p:par>
+                          <p:cTn id="16" fill="hold">
+                            <p:stCondLst>
+                              <p:cond delay="0"/>
+                            </p:stCondLst>
+                            <p:childTnLst>
+                              <p:par>
+                                <p:cTn id="17" presetID="1" presetClass="entr" presetSubtype="0" fill="hold" grpId="0" nodeType="clickEffect">
+                                  <p:stCondLst>
+                                    <p:cond delay="0"/>
+                                  </p:stCondLst>
+                                  <p:childTnLst>
+                                    <p:set>
+                                      <p:cBhvr>
+                                        <p:cTn id="18" dur="1" fill="hold">
+                                          <p:stCondLst>
+                                            <p:cond delay="0"/>
+                                          </p:stCondLst>
+                                        </p:cTn>
+                                        <p:tgtEl>
+                                          <p:spTgt spid="4">
+                                            <p:txEl>
+                                              <p:pRg st="0" end="0"/>
+                                            </p:txEl>
+                                          </p:spTgt>
+                                        </p:tgtEl>
+                                        <p:attrNameLst>
+                                          <p:attrName>style.visibility</p:attrName>
+                                        </p:attrNameLst>
+                                      </p:cBhvr>
+                                      <p:to>
+                                        <p:strVal val="visible"/>
+                                      </p:to>
+                                    </p:set>
+                                  </p:childTnLst>
+                                </p:cTn>
+                              </p:par>
+                              <p:par>
+                                <p:cTn id="19" presetID="1" presetClass="entr" presetSubtype="0" fill="hold" grpId="0" nodeType="withEffect">
+                                  <p:stCondLst>
+                                    <p:cond delay="0"/>
+                                  </p:stCondLst>
+                                  <p:childTnLst>
+                                    <p:set>
+                                      <p:cBhvr>
+                                        <p:cTn id="20" dur="1" fill="hold">
+                                          <p:stCondLst>
+                                            <p:cond delay="0"/>
+                                          </p:stCondLst>
+                                        </p:cTn>
+                                        <p:tgtEl>
+                                          <p:spTgt spid="4">
+                                            <p:txEl>
+                                              <p:pRg st="1" end="1"/>
+                                            </p:txEl>
+                                          </p:spTgt>
+                                        </p:tgtEl>
+                                        <p:attrNameLst>
+                                          <p:attrName>style.visibility</p:attrName>
+                                        </p:attrNameLst>
+                                      </p:cBhvr>
+                                      <p:to>
+                                        <p:strVal val="visible"/>
+                                      </p:to>
+                                    </p:set>
+                                  </p:childTnLst>
+                                </p:cTn>
+                              </p:par>
+                              <p:par>
+                                <p:cTn id="21" presetID="1" presetClass="entr" presetSubtype="0" fill="hold" grpId="0" nodeType="withEffect">
+                                  <p:stCondLst>
+                                    <p:cond delay="0"/>
+                                  </p:stCondLst>
+                                  <p:childTnLst>
+                                    <p:set>
+                                      <p:cBhvr>
+                                        <p:cTn id="22" dur="1" fill="hold">
+                                          <p:stCondLst>
+                                            <p:cond delay="0"/>
+                                          </p:stCondLst>
+                                        </p:cTn>
+                                        <p:tgtEl>
+                                          <p:spTgt spid="4">
+                                            <p:txEl>
+                                              <p:pRg st="2" end="2"/>
+                                            </p:txEl>
+                                          </p:spTgt>
+                                        </p:tgtEl>
+                                        <p:attrNameLst>
+                                          <p:attrName>style.visibility</p:attrName>
+                                        </p:attrNameLst>
+                                      </p:cBhvr>
+                                      <p:to>
+                                        <p:strVal val="visible"/>
+                                      </p:to>
+                                    </p:set>
+                                  </p:childTnLst>
+                                </p:cTn>
+                              </p:par>
+                              <p:par>
+                                <p:cTn id="23" presetID="1" presetClass="entr" presetSubtype="0" fill="hold" grpId="0" nodeType="withEffect">
+                                  <p:stCondLst>
+                                    <p:cond delay="0"/>
+                                  </p:stCondLst>
+                                  <p:childTnLst>
+                                    <p:set>
+                                      <p:cBhvr>
+                                        <p:cTn id="24" dur="1" fill="hold">
+                                          <p:stCondLst>
+                                            <p:cond delay="0"/>
+                                          </p:stCondLst>
+                                        </p:cTn>
+                                        <p:tgtEl>
+                                          <p:spTgt spid="4">
+                                            <p:txEl>
+                                              <p:pRg st="3" end="3"/>
+                                            </p:txEl>
+                                          </p:spTgt>
+                                        </p:tgtEl>
+                                        <p:attrNameLst>
+                                          <p:attrName>style.visibility</p:attrName>
+                                        </p:attrNameLst>
+                                      </p:cBhvr>
+                                      <p:to>
+                                        <p:strVal val="visible"/>
+                                      </p:to>
+                                    </p:set>
+                                  </p:childTnLst>
+                                </p:cTn>
+                              </p:par>
+                              <p:par>
+                                <p:cTn id="25" presetID="1" presetClass="entr" presetSubtype="0" fill="hold" grpId="0" nodeType="withEffect">
+                                  <p:stCondLst>
+                                    <p:cond delay="0"/>
+                                  </p:stCondLst>
+                                  <p:childTnLst>
+                                    <p:set>
+                                      <p:cBhvr>
+                                        <p:cTn id="26" dur="1" fill="hold">
+                                          <p:stCondLst>
+                                            <p:cond delay="0"/>
+                                          </p:stCondLst>
+                                        </p:cTn>
+                                        <p:tgtEl>
+                                          <p:spTgt spid="4">
+                                            <p:txEl>
+                                              <p:pRg st="4" end="4"/>
+                                            </p:txEl>
+                                          </p:spTgt>
+                                        </p:tgtEl>
+                                        <p:attrNameLst>
+                                          <p:attrName>style.visibility</p:attrName>
+                                        </p:attrNameLst>
+                                      </p:cBhvr>
+                                      <p:to>
+                                        <p:strVal val="visible"/>
+                                      </p:to>
+                                    </p:set>
+                                  </p:childTnLst>
+                                </p:cTn>
+                              </p:par>
+                            </p:childTnLst>
+                          </p:cTn>
+                        </p:par>
+                      </p:childTnLst>
+                    </p:cTn>
+                  </p:par>
+                </p:childTnLst>
+              </p:cTn>
+              <p:prevCondLst>
+                <p:cond evt="onPrev" delay="0">
+                  <p:tgtEl>
+                    <p:sldTgt/>
+                  </p:tgtEl>
+                </p:cond>
+              </p:prevCondLst>
+              <p:nextCondLst>
+                <p:cond evt="onNext" delay="0">
+                  <p:tgtEl>
+                    <p:sldTgt/>
+                  </p:tgtEl>
+                </p:cond>
+              </p:nextCondLst>
+            </p:seq>
+          </p:childTnLst>
+        </p:cTn>
+      </p:par>
+    </p:tnLst>
+    <p:bldLst>
+      <p:bldP spid="3" grpId="0" uiExpand="1" build="p"/>
+      <p:bldP spid="4" grpId="0" uiExpand="1" build="p"/>
+    </p:bldLst>
+  </p:timing>
+</p:sld>
+</file>
+
+<file path=ppt/slides/slide15.xml><?xml version="1.0" encoding="utf-8"?>
+<p:sld xmlns:a="http://schemas.openxmlformats.org/drawingml/2006/main" xmlns:r="http://schemas.openxmlformats.org/officeDocument/2006/relationships" xmlns:p="http://schemas.openxmlformats.org/presentationml/2006/main">
+  <p:cSld>
+    <p:spTree>
+      <p:nvGrpSpPr>
+        <p:cNvPr id="1" name=""/>
+        <p:cNvGrpSpPr/>
+        <p:nvPr/>
+      </p:nvGrpSpPr>
+      <p:grpSpPr>
+        <a:xfrm>
+          <a:off x="0" y="0"/>
+          <a:ext cx="0" cy="0"/>
+          <a:chOff x="0" y="0"/>
+          <a:chExt cx="0" cy="0"/>
+        </a:xfrm>
+      </p:grpSpPr>
+      <p:sp>
+        <p:nvSpPr>
+          <p:cNvPr id="6" name="Title 5">
+            <a:extLst>
+              <a:ext uri="{FF2B5EF4-FFF2-40B4-BE49-F238E27FC236}">
+                <a16:creationId xmlns:a16="http://schemas.microsoft.com/office/drawing/2014/main" id="{2D2726BD-6FBB-401A-A01F-5AAB7BECA214}"/>
+              </a:ext>
+            </a:extLst>
+          </p:cNvPr>
+          <p:cNvSpPr>
+            <a:spLocks noGrp="1"/>
+          </p:cNvSpPr>
+          <p:nvPr>
+            <p:ph type="title"/>
+          </p:nvPr>
+        </p:nvSpPr>
+        <p:spPr/>
+        <p:txBody>
+          <a:bodyPr/>
+          <a:lstStyle/>
+          <a:p>
+            <a:r>
+              <a:rPr lang="en-US" dirty="0"/>
+              <a:t>Important takeaways</a:t>
+            </a:r>
+          </a:p>
+        </p:txBody>
+      </p:sp>
+      <p:sp>
+        <p:nvSpPr>
+          <p:cNvPr id="7" name="Content Placeholder 6">
+            <a:extLst>
+              <a:ext uri="{FF2B5EF4-FFF2-40B4-BE49-F238E27FC236}">
+                <a16:creationId xmlns:a16="http://schemas.microsoft.com/office/drawing/2014/main" id="{AB0E80B3-BA38-42E3-884F-3D30AAAD10D5}"/>
+              </a:ext>
+            </a:extLst>
+          </p:cNvPr>
+          <p:cNvSpPr>
+            <a:spLocks noGrp="1"/>
+          </p:cNvSpPr>
+          <p:nvPr>
+            <p:ph idx="1"/>
+          </p:nvPr>
+        </p:nvSpPr>
+        <p:spPr/>
+        <p:txBody>
+          <a:bodyPr/>
+          <a:lstStyle/>
+          <a:p>
+            <a:r>
+              <a:rPr lang="en-US" dirty="0"/>
+              <a:t>Some of our assumptions were right…</a:t>
+            </a:r>
+          </a:p>
+          <a:p>
+            <a:r>
+              <a:rPr lang="en-US" dirty="0"/>
+              <a:t>…but not all of them.</a:t>
+            </a:r>
+          </a:p>
+          <a:p>
+            <a:r>
+              <a:rPr lang="en-US" dirty="0"/>
+              <a:t>We need to work on improving the quality of the information posted on our assets (Websites, Social Media, </a:t>
+            </a:r>
+            <a:r>
+              <a:rPr lang="en-US"/>
+              <a:t>for example)</a:t>
+            </a:r>
+            <a:endParaRPr lang="en-US" dirty="0"/>
+          </a:p>
+          <a:p>
+            <a:r>
+              <a:rPr lang="en-US" dirty="0"/>
+              <a:t>We should be aware of newer means of communicating with our district.</a:t>
+            </a:r>
+          </a:p>
+        </p:txBody>
+      </p:sp>
+      <p:sp>
+        <p:nvSpPr>
+          <p:cNvPr id="5" name="Slide Number Placeholder 4">
+            <a:extLst>
+              <a:ext uri="{FF2B5EF4-FFF2-40B4-BE49-F238E27FC236}">
+                <a16:creationId xmlns:a16="http://schemas.microsoft.com/office/drawing/2014/main" id="{FF1EDEA9-D3AF-4BBD-B177-7CB3F5A983BE}"/>
+              </a:ext>
+            </a:extLst>
+          </p:cNvPr>
+          <p:cNvSpPr>
+            <a:spLocks noGrp="1"/>
+          </p:cNvSpPr>
+          <p:nvPr>
+            <p:ph type="sldNum" sz="quarter" idx="10"/>
+          </p:nvPr>
+        </p:nvSpPr>
+        <p:spPr/>
+        <p:txBody>
+          <a:bodyPr/>
+          <a:lstStyle/>
+          <a:p>
+            <a:fld id="{F9676C15-1329-4304-9D2D-61847C382201}" type="slidenum">
+              <a:rPr lang="en-US" altLang="en-US" smtClean="0"/>
+              <a:pPr/>
+              <a:t>15</a:t>
+            </a:fld>
+            <a:endParaRPr lang="en-US" altLang="en-US"/>
+          </a:p>
+        </p:txBody>
+      </p:sp>
+    </p:spTree>
+    <p:extLst>
+      <p:ext uri="{BB962C8B-B14F-4D97-AF65-F5344CB8AC3E}">
+        <p14:creationId xmlns:p14="http://schemas.microsoft.com/office/powerpoint/2010/main" val="3837936306"/>
+      </p:ext>
+    </p:extLst>
+  </p:cSld>
+  <p:clrMapOvr>
+    <a:masterClrMapping/>
+  </p:clrMapOvr>
+  <p:timing>
+    <p:tnLst>
+      <p:par>
+        <p:cTn id="1" dur="indefinite" restart="never" nodeType="tmRoot">
+          <p:childTnLst>
+            <p:seq concurrent="1" nextAc="seek">
+              <p:cTn id="2" dur="indefinite" nodeType="mainSeq">
+                <p:childTnLst>
+                  <p:par>
+                    <p:cTn id="3" fill="hold">
+                      <p:stCondLst>
+                        <p:cond delay="indefinite"/>
+                      </p:stCondLst>
+                      <p:childTnLst>
+                        <p:par>
+                          <p:cTn id="4" fill="hold">
+                            <p:stCondLst>
+                              <p:cond delay="0"/>
+                            </p:stCondLst>
+                            <p:childTnLst>
+                              <p:par>
+                                <p:cTn id="5" presetID="1" presetClass="entr" presetSubtype="0" fill="hold" grpId="0" nodeType="clickEffect">
+                                  <p:stCondLst>
+                                    <p:cond delay="0"/>
+                                  </p:stCondLst>
+                                  <p:childTnLst>
+                                    <p:set>
+                                      <p:cBhvr>
+                                        <p:cTn id="6" dur="1" fill="hold">
+                                          <p:stCondLst>
+                                            <p:cond delay="0"/>
+                                          </p:stCondLst>
+                                        </p:cTn>
+                                        <p:tgtEl>
+                                          <p:spTgt spid="7">
+                                            <p:txEl>
+                                              <p:pRg st="0" end="0"/>
+                                            </p:txEl>
+                                          </p:spTgt>
+                                        </p:tgtEl>
+                                        <p:attrNameLst>
+                                          <p:attrName>style.visibility</p:attrName>
+                                        </p:attrNameLst>
+                                      </p:cBhvr>
+                                      <p:to>
+                                        <p:strVal val="visible"/>
+                                      </p:to>
+                                    </p:set>
+                                  </p:childTnLst>
+                                </p:cTn>
+                              </p:par>
+                            </p:childTnLst>
+                          </p:cTn>
+                        </p:par>
+                      </p:childTnLst>
+                    </p:cTn>
+                  </p:par>
+                  <p:par>
+                    <p:cTn id="7" fill="hold">
+                      <p:stCondLst>
+                        <p:cond delay="indefinite"/>
+                      </p:stCondLst>
+                      <p:childTnLst>
+                        <p:par>
+                          <p:cTn id="8" fill="hold">
+                            <p:stCondLst>
+                              <p:cond delay="0"/>
+                            </p:stCondLst>
+                            <p:childTnLst>
+                              <p:par>
+                                <p:cTn id="9" presetID="1" presetClass="entr" presetSubtype="0" fill="hold" grpId="0" nodeType="clickEffect">
+                                  <p:stCondLst>
+                                    <p:cond delay="0"/>
+                                  </p:stCondLst>
+                                  <p:childTnLst>
+                                    <p:set>
+                                      <p:cBhvr>
+                                        <p:cTn id="10" dur="1" fill="hold">
+                                          <p:stCondLst>
+                                            <p:cond delay="0"/>
+                                          </p:stCondLst>
+                                        </p:cTn>
+                                        <p:tgtEl>
+                                          <p:spTgt spid="7">
+                                            <p:txEl>
+                                              <p:pRg st="1" end="1"/>
+                                            </p:txEl>
+                                          </p:spTgt>
+                                        </p:tgtEl>
+                                        <p:attrNameLst>
+                                          <p:attrName>style.visibility</p:attrName>
+                                        </p:attrNameLst>
+                                      </p:cBhvr>
+                                      <p:to>
+                                        <p:strVal val="visible"/>
+                                      </p:to>
+                                    </p:set>
+                                  </p:childTnLst>
+                                </p:cTn>
+                              </p:par>
+                            </p:childTnLst>
+                          </p:cTn>
+                        </p:par>
+                      </p:childTnLst>
+                    </p:cTn>
+                  </p:par>
+                  <p:par>
+                    <p:cTn id="11" fill="hold">
+                      <p:stCondLst>
+                        <p:cond delay="indefinite"/>
+                      </p:stCondLst>
+                      <p:childTnLst>
+                        <p:par>
+                          <p:cTn id="12" fill="hold">
+                            <p:stCondLst>
+                              <p:cond delay="0"/>
+                            </p:stCondLst>
+                            <p:childTnLst>
+                              <p:par>
+                                <p:cTn id="13" presetID="1" presetClass="entr" presetSubtype="0" fill="hold" grpId="0" nodeType="clickEffect">
+                                  <p:stCondLst>
+                                    <p:cond delay="0"/>
+                                  </p:stCondLst>
+                                  <p:childTnLst>
+                                    <p:set>
+                                      <p:cBhvr>
+                                        <p:cTn id="14" dur="1" fill="hold">
+                                          <p:stCondLst>
+                                            <p:cond delay="0"/>
+                                          </p:stCondLst>
+                                        </p:cTn>
+                                        <p:tgtEl>
+                                          <p:spTgt spid="7">
+                                            <p:txEl>
+                                              <p:pRg st="2" end="2"/>
+                                            </p:txEl>
+                                          </p:spTgt>
+                                        </p:tgtEl>
+                                        <p:attrNameLst>
+                                          <p:attrName>style.visibility</p:attrName>
+                                        </p:attrNameLst>
+                                      </p:cBhvr>
+                                      <p:to>
+                                        <p:strVal val="visible"/>
+                                      </p:to>
+                                    </p:set>
+                                  </p:childTnLst>
+                                </p:cTn>
+                              </p:par>
+                            </p:childTnLst>
+                          </p:cTn>
+                        </p:par>
+                      </p:childTnLst>
+                    </p:cTn>
+                  </p:par>
+                  <p:par>
+                    <p:cTn id="15" fill="hold">
+                      <p:stCondLst>
+                        <p:cond delay="indefinite"/>
+                      </p:stCondLst>
+                      <p:childTnLst>
+                        <p:par>
+                          <p:cTn id="16" fill="hold">
+                            <p:stCondLst>
+                              <p:cond delay="0"/>
+                            </p:stCondLst>
+                            <p:childTnLst>
+                              <p:par>
+                                <p:cTn id="17" presetID="1" presetClass="entr" presetSubtype="0" fill="hold" grpId="0" nodeType="clickEffect">
+                                  <p:stCondLst>
+                                    <p:cond delay="0"/>
+                                  </p:stCondLst>
+                                  <p:childTnLst>
+                                    <p:set>
+                                      <p:cBhvr>
+                                        <p:cTn id="18" dur="1" fill="hold">
+                                          <p:stCondLst>
+                                            <p:cond delay="0"/>
+                                          </p:stCondLst>
+                                        </p:cTn>
+                                        <p:tgtEl>
+                                          <p:spTgt spid="7">
+                                            <p:txEl>
+                                              <p:pRg st="3" end="3"/>
+                                            </p:txEl>
+                                          </p:spTgt>
+                                        </p:tgtEl>
+                                        <p:attrNameLst>
+                                          <p:attrName>style.visibility</p:attrName>
+                                        </p:attrNameLst>
+                                      </p:cBhvr>
+                                      <p:to>
+                                        <p:strVal val="visible"/>
+                                      </p:to>
+                                    </p:set>
+                                  </p:childTnLst>
+                                </p:cTn>
+                              </p:par>
+                            </p:childTnLst>
+                          </p:cTn>
+                        </p:par>
+                      </p:childTnLst>
+                    </p:cTn>
+                  </p:par>
+                </p:childTnLst>
+              </p:cTn>
+              <p:prevCondLst>
+                <p:cond evt="onPrev" delay="0">
+                  <p:tgtEl>
+                    <p:sldTgt/>
+                  </p:tgtEl>
+                </p:cond>
+              </p:prevCondLst>
+              <p:nextCondLst>
+                <p:cond evt="onNext" delay="0">
+                  <p:tgtEl>
+                    <p:sldTgt/>
+                  </p:tgtEl>
+                </p:cond>
+              </p:nextCondLst>
+            </p:seq>
+          </p:childTnLst>
+        </p:cTn>
+      </p:par>
+    </p:tnLst>
+    <p:bldLst>
+      <p:bldP spid="7" grpId="0" uiExpand="1" build="p"/>
+    </p:bldLst>
+  </p:timing>
 </p:sld>
 </file>
 
@@ -5553,7 +6302,7 @@
                 <a:latin typeface="Helvetica" panose="020B0604020202020204" pitchFamily="34" charset="0"/>
                 <a:ea typeface="ヒラギノ角ゴ Pro W3" charset="-128"/>
               </a:rPr>
-              <a:t>What forms of communications are used?</a:t>
+              <a:t>What forms of communications are our volunteers using?</a:t>
             </a:r>
           </a:p>
           <a:p>
@@ -5566,7 +6315,7 @@
                 <a:latin typeface="Helvetica" panose="020B0604020202020204" pitchFamily="34" charset="0"/>
                 <a:ea typeface="ヒラギノ角ゴ Pro W3" charset="-128"/>
               </a:rPr>
-              <a:t>What is the preferred means of communication?</a:t>
+              <a:t>What form of communication do they prefer to use?</a:t>
             </a:r>
           </a:p>
           <a:p>
@@ -5757,6 +6506,266 @@
   <p:clrMapOvr>
     <a:masterClrMapping/>
   </p:clrMapOvr>
+  <p:timing>
+    <p:tnLst>
+      <p:par>
+        <p:cTn id="1" dur="indefinite" restart="never" nodeType="tmRoot">
+          <p:childTnLst>
+            <p:seq concurrent="1" nextAc="seek">
+              <p:cTn id="2" dur="indefinite" nodeType="mainSeq">
+                <p:childTnLst>
+                  <p:par>
+                    <p:cTn id="3" fill="hold">
+                      <p:stCondLst>
+                        <p:cond delay="indefinite"/>
+                      </p:stCondLst>
+                      <p:childTnLst>
+                        <p:par>
+                          <p:cTn id="4" fill="hold">
+                            <p:stCondLst>
+                              <p:cond delay="0"/>
+                            </p:stCondLst>
+                            <p:childTnLst>
+                              <p:par>
+                                <p:cTn id="5" presetID="1" presetClass="entr" presetSubtype="0" fill="hold" grpId="0" nodeType="clickEffect">
+                                  <p:stCondLst>
+                                    <p:cond delay="0"/>
+                                  </p:stCondLst>
+                                  <p:childTnLst>
+                                    <p:set>
+                                      <p:cBhvr>
+                                        <p:cTn id="6" dur="1" fill="hold">
+                                          <p:stCondLst>
+                                            <p:cond delay="0"/>
+                                          </p:stCondLst>
+                                        </p:cTn>
+                                        <p:tgtEl>
+                                          <p:spTgt spid="12290">
+                                            <p:txEl>
+                                              <p:pRg st="0" end="0"/>
+                                            </p:txEl>
+                                          </p:spTgt>
+                                        </p:tgtEl>
+                                        <p:attrNameLst>
+                                          <p:attrName>style.visibility</p:attrName>
+                                        </p:attrNameLst>
+                                      </p:cBhvr>
+                                      <p:to>
+                                        <p:strVal val="visible"/>
+                                      </p:to>
+                                    </p:set>
+                                  </p:childTnLst>
+                                </p:cTn>
+                              </p:par>
+                              <p:par>
+                                <p:cTn id="7" presetID="1" presetClass="entr" presetSubtype="0" fill="hold" grpId="0" nodeType="withEffect">
+                                  <p:stCondLst>
+                                    <p:cond delay="0"/>
+                                  </p:stCondLst>
+                                  <p:childTnLst>
+                                    <p:set>
+                                      <p:cBhvr>
+                                        <p:cTn id="8" dur="1" fill="hold">
+                                          <p:stCondLst>
+                                            <p:cond delay="0"/>
+                                          </p:stCondLst>
+                                        </p:cTn>
+                                        <p:tgtEl>
+                                          <p:spTgt spid="12290">
+                                            <p:txEl>
+                                              <p:pRg st="1" end="1"/>
+                                            </p:txEl>
+                                          </p:spTgt>
+                                        </p:tgtEl>
+                                        <p:attrNameLst>
+                                          <p:attrName>style.visibility</p:attrName>
+                                        </p:attrNameLst>
+                                      </p:cBhvr>
+                                      <p:to>
+                                        <p:strVal val="visible"/>
+                                      </p:to>
+                                    </p:set>
+                                  </p:childTnLst>
+                                </p:cTn>
+                              </p:par>
+                            </p:childTnLst>
+                          </p:cTn>
+                        </p:par>
+                      </p:childTnLst>
+                    </p:cTn>
+                  </p:par>
+                  <p:par>
+                    <p:cTn id="9" fill="hold">
+                      <p:stCondLst>
+                        <p:cond delay="indefinite"/>
+                      </p:stCondLst>
+                      <p:childTnLst>
+                        <p:par>
+                          <p:cTn id="10" fill="hold">
+                            <p:stCondLst>
+                              <p:cond delay="0"/>
+                            </p:stCondLst>
+                            <p:childTnLst>
+                              <p:par>
+                                <p:cTn id="11" presetID="1" presetClass="entr" presetSubtype="0" fill="hold" grpId="0" nodeType="clickEffect">
+                                  <p:stCondLst>
+                                    <p:cond delay="0"/>
+                                  </p:stCondLst>
+                                  <p:childTnLst>
+                                    <p:set>
+                                      <p:cBhvr>
+                                        <p:cTn id="12" dur="1" fill="hold">
+                                          <p:stCondLst>
+                                            <p:cond delay="0"/>
+                                          </p:stCondLst>
+                                        </p:cTn>
+                                        <p:tgtEl>
+                                          <p:spTgt spid="12290">
+                                            <p:txEl>
+                                              <p:pRg st="2" end="2"/>
+                                            </p:txEl>
+                                          </p:spTgt>
+                                        </p:tgtEl>
+                                        <p:attrNameLst>
+                                          <p:attrName>style.visibility</p:attrName>
+                                        </p:attrNameLst>
+                                      </p:cBhvr>
+                                      <p:to>
+                                        <p:strVal val="visible"/>
+                                      </p:to>
+                                    </p:set>
+                                  </p:childTnLst>
+                                </p:cTn>
+                              </p:par>
+                            </p:childTnLst>
+                          </p:cTn>
+                        </p:par>
+                      </p:childTnLst>
+                    </p:cTn>
+                  </p:par>
+                  <p:par>
+                    <p:cTn id="13" fill="hold">
+                      <p:stCondLst>
+                        <p:cond delay="indefinite"/>
+                      </p:stCondLst>
+                      <p:childTnLst>
+                        <p:par>
+                          <p:cTn id="14" fill="hold">
+                            <p:stCondLst>
+                              <p:cond delay="0"/>
+                            </p:stCondLst>
+                            <p:childTnLst>
+                              <p:par>
+                                <p:cTn id="15" presetID="1" presetClass="entr" presetSubtype="0" fill="hold" grpId="0" nodeType="clickEffect">
+                                  <p:stCondLst>
+                                    <p:cond delay="0"/>
+                                  </p:stCondLst>
+                                  <p:childTnLst>
+                                    <p:set>
+                                      <p:cBhvr>
+                                        <p:cTn id="16" dur="1" fill="hold">
+                                          <p:stCondLst>
+                                            <p:cond delay="0"/>
+                                          </p:stCondLst>
+                                        </p:cTn>
+                                        <p:tgtEl>
+                                          <p:spTgt spid="12290">
+                                            <p:txEl>
+                                              <p:pRg st="3" end="3"/>
+                                            </p:txEl>
+                                          </p:spTgt>
+                                        </p:tgtEl>
+                                        <p:attrNameLst>
+                                          <p:attrName>style.visibility</p:attrName>
+                                        </p:attrNameLst>
+                                      </p:cBhvr>
+                                      <p:to>
+                                        <p:strVal val="visible"/>
+                                      </p:to>
+                                    </p:set>
+                                  </p:childTnLst>
+                                </p:cTn>
+                              </p:par>
+                            </p:childTnLst>
+                          </p:cTn>
+                        </p:par>
+                      </p:childTnLst>
+                    </p:cTn>
+                  </p:par>
+                  <p:par>
+                    <p:cTn id="17" fill="hold">
+                      <p:stCondLst>
+                        <p:cond delay="indefinite"/>
+                      </p:stCondLst>
+                      <p:childTnLst>
+                        <p:par>
+                          <p:cTn id="18" fill="hold">
+                            <p:stCondLst>
+                              <p:cond delay="0"/>
+                            </p:stCondLst>
+                            <p:childTnLst>
+                              <p:par>
+                                <p:cTn id="19" presetID="1" presetClass="entr" presetSubtype="0" fill="hold" grpId="0" nodeType="clickEffect">
+                                  <p:stCondLst>
+                                    <p:cond delay="0"/>
+                                  </p:stCondLst>
+                                  <p:childTnLst>
+                                    <p:set>
+                                      <p:cBhvr>
+                                        <p:cTn id="20" dur="1" fill="hold">
+                                          <p:stCondLst>
+                                            <p:cond delay="0"/>
+                                          </p:stCondLst>
+                                        </p:cTn>
+                                        <p:tgtEl>
+                                          <p:spTgt spid="12290">
+                                            <p:txEl>
+                                              <p:pRg st="4" end="4"/>
+                                            </p:txEl>
+                                          </p:spTgt>
+                                        </p:tgtEl>
+                                        <p:attrNameLst>
+                                          <p:attrName>style.visibility</p:attrName>
+                                        </p:attrNameLst>
+                                      </p:cBhvr>
+                                      <p:to>
+                                        <p:strVal val="visible"/>
+                                      </p:to>
+                                    </p:set>
+                                  </p:childTnLst>
+                                </p:cTn>
+                              </p:par>
+                            </p:childTnLst>
+                          </p:cTn>
+                        </p:par>
+                      </p:childTnLst>
+                    </p:cTn>
+                  </p:par>
+                </p:childTnLst>
+              </p:cTn>
+              <p:prevCondLst>
+                <p:cond evt="onPrev" delay="0">
+                  <p:tgtEl>
+                    <p:sldTgt/>
+                  </p:tgtEl>
+                </p:cond>
+              </p:prevCondLst>
+              <p:nextCondLst>
+                <p:cond evt="onNext" delay="0">
+                  <p:tgtEl>
+                    <p:sldTgt/>
+                  </p:tgtEl>
+                </p:cond>
+              </p:nextCondLst>
+            </p:seq>
+          </p:childTnLst>
+        </p:cTn>
+      </p:par>
+    </p:tnLst>
+    <p:bldLst>
+      <p:bldP spid="12290" grpId="0" uiExpand="1" build="p"/>
+    </p:bldLst>
+  </p:timing>
 </p:sld>
 </file>
 
@@ -6029,10 +7038,10 @@
       </p:sp>
       <p:pic>
         <p:nvPicPr>
-          <p:cNvPr id="2" name="Picture 1">
+          <p:cNvPr id="3" name="Picture 2">
             <a:extLst>
               <a:ext uri="{FF2B5EF4-FFF2-40B4-BE49-F238E27FC236}">
-                <a16:creationId xmlns:a16="http://schemas.microsoft.com/office/drawing/2014/main" id="{8F2B7E50-DB0B-40DA-9382-177ECFF7B5C3}"/>
+                <a16:creationId xmlns:a16="http://schemas.microsoft.com/office/drawing/2014/main" id="{80ED7B8A-64E9-4CB0-A413-65405D2FA834}"/>
               </a:ext>
             </a:extLst>
           </p:cNvPr>
@@ -6049,8 +7058,8 @@
         </p:blipFill>
         <p:spPr>
           <a:xfrm>
-            <a:off x="1848375" y="1927658"/>
-            <a:ext cx="5447250" cy="3578946"/>
+            <a:off x="1566863" y="2279906"/>
+            <a:ext cx="5904298" cy="3243530"/>
           </a:xfrm>
           <a:prstGeom prst="rect">
             <a:avLst/>
@@ -6339,10 +7348,10 @@
       </p:sp>
       <p:pic>
         <p:nvPicPr>
-          <p:cNvPr id="3" name="Picture 2">
+          <p:cNvPr id="4" name="Picture 3">
             <a:extLst>
               <a:ext uri="{FF2B5EF4-FFF2-40B4-BE49-F238E27FC236}">
-                <a16:creationId xmlns:a16="http://schemas.microsoft.com/office/drawing/2014/main" id="{8114AB31-B40A-4BB6-B399-B21E53BCD7AC}"/>
+                <a16:creationId xmlns:a16="http://schemas.microsoft.com/office/drawing/2014/main" id="{3E402551-0353-4462-BC2F-07FE18BE99AA}"/>
               </a:ext>
             </a:extLst>
           </p:cNvPr>
@@ -6359,8 +7368,8 @@
         </p:blipFill>
         <p:spPr>
           <a:xfrm>
-            <a:off x="1652587" y="2121693"/>
-            <a:ext cx="5838825" cy="3190875"/>
+            <a:off x="1067962" y="2176463"/>
+            <a:ext cx="7008075" cy="3657600"/>
           </a:xfrm>
           <a:prstGeom prst="rect">
             <a:avLst/>
@@ -6687,6 +7696,36 @@
           </a:prstGeom>
         </p:spPr>
       </p:pic>
+      <p:pic>
+        <p:nvPicPr>
+          <p:cNvPr id="2" name="Picture 1">
+            <a:extLst>
+              <a:ext uri="{FF2B5EF4-FFF2-40B4-BE49-F238E27FC236}">
+                <a16:creationId xmlns:a16="http://schemas.microsoft.com/office/drawing/2014/main" id="{D96FC322-9484-48F3-8A56-B403D85992B5}"/>
+              </a:ext>
+            </a:extLst>
+          </p:cNvPr>
+          <p:cNvPicPr>
+            <a:picLocks noChangeAspect="1"/>
+          </p:cNvPicPr>
+          <p:nvPr/>
+        </p:nvPicPr>
+        <p:blipFill>
+          <a:blip r:embed="rId3"/>
+          <a:stretch>
+            <a:fillRect/>
+          </a:stretch>
+        </p:blipFill>
+        <p:spPr>
+          <a:xfrm>
+            <a:off x="1186961" y="2176463"/>
+            <a:ext cx="6770077" cy="3657600"/>
+          </a:xfrm>
+          <a:prstGeom prst="rect">
+            <a:avLst/>
+          </a:prstGeom>
+        </p:spPr>
+      </p:pic>
     </p:spTree>
     <p:extLst>
       <p:ext uri="{BB962C8B-B14F-4D97-AF65-F5344CB8AC3E}">
@@ -6969,10 +8008,10 @@
       </p:sp>
       <p:pic>
         <p:nvPicPr>
-          <p:cNvPr id="4" name="Picture 3">
+          <p:cNvPr id="2" name="Picture 1">
             <a:extLst>
               <a:ext uri="{FF2B5EF4-FFF2-40B4-BE49-F238E27FC236}">
-                <a16:creationId xmlns:a16="http://schemas.microsoft.com/office/drawing/2014/main" id="{D75CF730-963F-45F4-A34D-C7176309790A}"/>
+                <a16:creationId xmlns:a16="http://schemas.microsoft.com/office/drawing/2014/main" id="{860DA33C-52D1-404E-8E49-900F02A1382C}"/>
               </a:ext>
             </a:extLst>
           </p:cNvPr>
@@ -6989,8 +8028,8 @@
         </p:blipFill>
         <p:spPr>
           <a:xfrm>
-            <a:off x="1157287" y="2216943"/>
-            <a:ext cx="6829425" cy="3000375"/>
+            <a:off x="733586" y="2176463"/>
+            <a:ext cx="7676828" cy="3657600"/>
           </a:xfrm>
           <a:prstGeom prst="rect">
             <a:avLst/>
@@ -7279,10 +8318,10 @@
       </p:sp>
       <p:pic>
         <p:nvPicPr>
-          <p:cNvPr id="2" name="Picture 1">
+          <p:cNvPr id="3" name="Picture 2">
             <a:extLst>
               <a:ext uri="{FF2B5EF4-FFF2-40B4-BE49-F238E27FC236}">
-                <a16:creationId xmlns:a16="http://schemas.microsoft.com/office/drawing/2014/main" id="{29E18265-2CE4-4726-A23F-1C8CD6B2A429}"/>
+                <a16:creationId xmlns:a16="http://schemas.microsoft.com/office/drawing/2014/main" id="{17974EB8-CE15-49D4-85AE-55ADB77CDEB2}"/>
               </a:ext>
             </a:extLst>
           </p:cNvPr>
@@ -7299,8 +8338,8 @@
         </p:blipFill>
         <p:spPr>
           <a:xfrm>
-            <a:off x="1123950" y="2074068"/>
-            <a:ext cx="6896100" cy="3286125"/>
+            <a:off x="852755" y="2176463"/>
+            <a:ext cx="7438489" cy="3657600"/>
           </a:xfrm>
           <a:prstGeom prst="rect">
             <a:avLst/>
@@ -7589,10 +8628,10 @@
       </p:sp>
       <p:pic>
         <p:nvPicPr>
-          <p:cNvPr id="2" name="Picture 1">
+          <p:cNvPr id="3" name="Picture 2">
             <a:extLst>
               <a:ext uri="{FF2B5EF4-FFF2-40B4-BE49-F238E27FC236}">
-                <a16:creationId xmlns:a16="http://schemas.microsoft.com/office/drawing/2014/main" id="{B2B5710B-3977-4F3C-A977-9778BFD96D9A}"/>
+                <a16:creationId xmlns:a16="http://schemas.microsoft.com/office/drawing/2014/main" id="{4F05186A-1836-43FC-897E-A1D50B26FB5C}"/>
               </a:ext>
             </a:extLst>
           </p:cNvPr>
@@ -7609,8 +8648,8 @@
         </p:blipFill>
         <p:spPr>
           <a:xfrm>
-            <a:off x="1176337" y="2078831"/>
-            <a:ext cx="6791325" cy="3276600"/>
+            <a:off x="878339" y="2176463"/>
+            <a:ext cx="7387322" cy="3657600"/>
           </a:xfrm>
           <a:prstGeom prst="rect">
             <a:avLst/>
@@ -7899,10 +8938,10 @@
       </p:sp>
       <p:pic>
         <p:nvPicPr>
-          <p:cNvPr id="2" name="Picture 1">
+          <p:cNvPr id="3" name="Picture 2">
             <a:extLst>
               <a:ext uri="{FF2B5EF4-FFF2-40B4-BE49-F238E27FC236}">
-                <a16:creationId xmlns:a16="http://schemas.microsoft.com/office/drawing/2014/main" id="{0D6A259E-D755-435B-A634-8A80D7C7910F}"/>
+                <a16:creationId xmlns:a16="http://schemas.microsoft.com/office/drawing/2014/main" id="{99F1E38B-8631-4D82-9A29-06F75C5F25B1}"/>
               </a:ext>
             </a:extLst>
           </p:cNvPr>
@@ -7919,8 +8958,8 @@
         </p:blipFill>
         <p:spPr>
           <a:xfrm>
-            <a:off x="1157287" y="2102643"/>
-            <a:ext cx="6829425" cy="3228975"/>
+            <a:off x="592975" y="2176463"/>
+            <a:ext cx="7958050" cy="3657600"/>
           </a:xfrm>
           <a:prstGeom prst="rect">
             <a:avLst/>

</xml_diff>